<commit_message>
updating docs, removing outdated diagrams
</commit_message>
<xml_diff>
--- a/docs/demultiplex-qc.pptx
+++ b/docs/demultiplex-qc.pptx
@@ -289,7 +289,7 @@
           <a:p>
             <a:fld id="{2FBCE28E-874C-594A-8F36-6C6B539969F9}" type="datetimeFigureOut">
               <a:rPr lang="en-US" smtClean="0"/>
-              <a:t>09/07/15</a:t>
+              <a:t>23.09.15</a:t>
             </a:fld>
             <a:endParaRPr lang="en-US"/>
           </a:p>
@@ -459,7 +459,7 @@
           <a:p>
             <a:fld id="{2FBCE28E-874C-594A-8F36-6C6B539969F9}" type="datetimeFigureOut">
               <a:rPr lang="en-US" smtClean="0"/>
-              <a:t>09/07/15</a:t>
+              <a:t>23.09.15</a:t>
             </a:fld>
             <a:endParaRPr lang="en-US"/>
           </a:p>
@@ -639,7 +639,7 @@
           <a:p>
             <a:fld id="{2FBCE28E-874C-594A-8F36-6C6B539969F9}" type="datetimeFigureOut">
               <a:rPr lang="en-US" smtClean="0"/>
-              <a:t>09/07/15</a:t>
+              <a:t>23.09.15</a:t>
             </a:fld>
             <a:endParaRPr lang="en-US"/>
           </a:p>
@@ -809,7 +809,7 @@
           <a:p>
             <a:fld id="{2FBCE28E-874C-594A-8F36-6C6B539969F9}" type="datetimeFigureOut">
               <a:rPr lang="en-US" smtClean="0"/>
-              <a:t>09/07/15</a:t>
+              <a:t>23.09.15</a:t>
             </a:fld>
             <a:endParaRPr lang="en-US"/>
           </a:p>
@@ -1055,7 +1055,7 @@
           <a:p>
             <a:fld id="{2FBCE28E-874C-594A-8F36-6C6B539969F9}" type="datetimeFigureOut">
               <a:rPr lang="en-US" smtClean="0"/>
-              <a:t>09/07/15</a:t>
+              <a:t>23.09.15</a:t>
             </a:fld>
             <a:endParaRPr lang="en-US"/>
           </a:p>
@@ -1343,7 +1343,7 @@
           <a:p>
             <a:fld id="{2FBCE28E-874C-594A-8F36-6C6B539969F9}" type="datetimeFigureOut">
               <a:rPr lang="en-US" smtClean="0"/>
-              <a:t>09/07/15</a:t>
+              <a:t>23.09.15</a:t>
             </a:fld>
             <a:endParaRPr lang="en-US"/>
           </a:p>
@@ -1765,7 +1765,7 @@
           <a:p>
             <a:fld id="{2FBCE28E-874C-594A-8F36-6C6B539969F9}" type="datetimeFigureOut">
               <a:rPr lang="en-US" smtClean="0"/>
-              <a:t>09/07/15</a:t>
+              <a:t>23.09.15</a:t>
             </a:fld>
             <a:endParaRPr lang="en-US"/>
           </a:p>
@@ -1883,7 +1883,7 @@
           <a:p>
             <a:fld id="{2FBCE28E-874C-594A-8F36-6C6B539969F9}" type="datetimeFigureOut">
               <a:rPr lang="en-US" smtClean="0"/>
-              <a:t>09/07/15</a:t>
+              <a:t>23.09.15</a:t>
             </a:fld>
             <a:endParaRPr lang="en-US"/>
           </a:p>
@@ -1978,7 +1978,7 @@
           <a:p>
             <a:fld id="{2FBCE28E-874C-594A-8F36-6C6B539969F9}" type="datetimeFigureOut">
               <a:rPr lang="en-US" smtClean="0"/>
-              <a:t>09/07/15</a:t>
+              <a:t>23.09.15</a:t>
             </a:fld>
             <a:endParaRPr lang="en-US"/>
           </a:p>
@@ -2255,7 +2255,7 @@
           <a:p>
             <a:fld id="{2FBCE28E-874C-594A-8F36-6C6B539969F9}" type="datetimeFigureOut">
               <a:rPr lang="en-US" smtClean="0"/>
-              <a:t>09/07/15</a:t>
+              <a:t>23.09.15</a:t>
             </a:fld>
             <a:endParaRPr lang="en-US"/>
           </a:p>
@@ -2508,7 +2508,7 @@
           <a:p>
             <a:fld id="{2FBCE28E-874C-594A-8F36-6C6B539969F9}" type="datetimeFigureOut">
               <a:rPr lang="en-US" smtClean="0"/>
-              <a:t>09/07/15</a:t>
+              <a:t>23.09.15</a:t>
             </a:fld>
             <a:endParaRPr lang="en-US"/>
           </a:p>
@@ -2721,7 +2721,7 @@
           <a:p>
             <a:fld id="{2FBCE28E-874C-594A-8F36-6C6B539969F9}" type="datetimeFigureOut">
               <a:rPr lang="en-US" smtClean="0"/>
-              <a:t>09/07/15</a:t>
+              <a:t>23.09.15</a:t>
             </a:fld>
             <a:endParaRPr lang="en-US"/>
           </a:p>
@@ -3976,150 +3976,6 @@
           </a:p>
         </p:txBody>
       </p:sp>
-      <p:cxnSp>
-        <p:nvCxnSpPr>
-          <p:cNvPr id="26" name="Straight Arrow Connector 25"/>
-          <p:cNvCxnSpPr>
-            <a:stCxn id="30" idx="3"/>
-            <a:endCxn id="31" idx="0"/>
-          </p:cNvCxnSpPr>
-          <p:nvPr/>
-        </p:nvCxnSpPr>
-        <p:spPr>
-          <a:xfrm>
-            <a:off x="2188449" y="925789"/>
-            <a:ext cx="60640" cy="322524"/>
-          </a:xfrm>
-          <a:prstGeom prst="straightConnector1">
-            <a:avLst/>
-          </a:prstGeom>
-          <a:ln>
-            <a:tailEnd type="arrow"/>
-          </a:ln>
-        </p:spPr>
-        <p:style>
-          <a:lnRef idx="2">
-            <a:schemeClr val="accent3"/>
-          </a:lnRef>
-          <a:fillRef idx="0">
-            <a:schemeClr val="accent3"/>
-          </a:fillRef>
-          <a:effectRef idx="1">
-            <a:schemeClr val="accent3"/>
-          </a:effectRef>
-          <a:fontRef idx="minor">
-            <a:schemeClr val="tx1"/>
-          </a:fontRef>
-        </p:style>
-      </p:cxnSp>
-      <p:cxnSp>
-        <p:nvCxnSpPr>
-          <p:cNvPr id="27" name="Straight Arrow Connector 26"/>
-          <p:cNvCxnSpPr>
-            <a:stCxn id="30" idx="3"/>
-            <a:endCxn id="11" idx="0"/>
-          </p:cNvCxnSpPr>
-          <p:nvPr/>
-        </p:nvCxnSpPr>
-        <p:spPr>
-          <a:xfrm>
-            <a:off x="2188449" y="925789"/>
-            <a:ext cx="1615230" cy="322524"/>
-          </a:xfrm>
-          <a:prstGeom prst="straightConnector1">
-            <a:avLst/>
-          </a:prstGeom>
-          <a:ln>
-            <a:tailEnd type="arrow"/>
-          </a:ln>
-        </p:spPr>
-        <p:style>
-          <a:lnRef idx="2">
-            <a:schemeClr val="accent3"/>
-          </a:lnRef>
-          <a:fillRef idx="0">
-            <a:schemeClr val="accent3"/>
-          </a:fillRef>
-          <a:effectRef idx="1">
-            <a:schemeClr val="accent3"/>
-          </a:effectRef>
-          <a:fontRef idx="minor">
-            <a:schemeClr val="tx1"/>
-          </a:fontRef>
-        </p:style>
-      </p:cxnSp>
-      <p:cxnSp>
-        <p:nvCxnSpPr>
-          <p:cNvPr id="28" name="Straight Arrow Connector 27"/>
-          <p:cNvCxnSpPr>
-            <a:stCxn id="30" idx="3"/>
-            <a:endCxn id="10" idx="0"/>
-          </p:cNvCxnSpPr>
-          <p:nvPr/>
-        </p:nvCxnSpPr>
-        <p:spPr>
-          <a:xfrm>
-            <a:off x="2188449" y="925789"/>
-            <a:ext cx="3246759" cy="322524"/>
-          </a:xfrm>
-          <a:prstGeom prst="straightConnector1">
-            <a:avLst/>
-          </a:prstGeom>
-          <a:ln>
-            <a:tailEnd type="arrow"/>
-          </a:ln>
-        </p:spPr>
-        <p:style>
-          <a:lnRef idx="2">
-            <a:schemeClr val="accent3"/>
-          </a:lnRef>
-          <a:fillRef idx="0">
-            <a:schemeClr val="accent3"/>
-          </a:fillRef>
-          <a:effectRef idx="1">
-            <a:schemeClr val="accent3"/>
-          </a:effectRef>
-          <a:fontRef idx="minor">
-            <a:schemeClr val="tx1"/>
-          </a:fontRef>
-        </p:style>
-      </p:cxnSp>
-      <p:cxnSp>
-        <p:nvCxnSpPr>
-          <p:cNvPr id="29" name="Straight Arrow Connector 28"/>
-          <p:cNvCxnSpPr>
-            <a:stCxn id="30" idx="3"/>
-            <a:endCxn id="8" idx="0"/>
-          </p:cNvCxnSpPr>
-          <p:nvPr/>
-        </p:nvCxnSpPr>
-        <p:spPr>
-          <a:xfrm>
-            <a:off x="2188449" y="925789"/>
-            <a:ext cx="5057096" cy="322524"/>
-          </a:xfrm>
-          <a:prstGeom prst="straightConnector1">
-            <a:avLst/>
-          </a:prstGeom>
-          <a:ln>
-            <a:tailEnd type="arrow"/>
-          </a:ln>
-        </p:spPr>
-        <p:style>
-          <a:lnRef idx="2">
-            <a:schemeClr val="accent3"/>
-          </a:lnRef>
-          <a:fillRef idx="0">
-            <a:schemeClr val="accent3"/>
-          </a:fillRef>
-          <a:effectRef idx="1">
-            <a:schemeClr val="accent3"/>
-          </a:effectRef>
-          <a:fontRef idx="minor">
-            <a:schemeClr val="tx1"/>
-          </a:fontRef>
-        </p:style>
-      </p:cxnSp>
       <p:sp>
         <p:nvSpPr>
           <p:cNvPr id="30" name="Rectangle 29"/>
@@ -4156,11 +4012,7 @@
             <a:pPr algn="ctr"/>
             <a:r>
               <a:rPr lang="en-US" sz="800" dirty="0" err="1" smtClean="0"/>
-              <a:t>MiSeq</a:t>
-            </a:r>
-            <a:r>
-              <a:rPr lang="en-US" sz="800" dirty="0" smtClean="0"/>
-              <a:t> dependency</a:t>
+              <a:t>MiSeqdependency</a:t>
             </a:r>
             <a:endParaRPr lang="en-US" sz="800" dirty="0"/>
           </a:p>

</xml_diff>